<commit_message>
Aggiunta ultima slide. Valutare se può essere portato cosi o ci sono ancora cose da modificare
</commit_message>
<xml_diff>
--- a/mockup/presentazione - def.pptx
+++ b/mockup/presentazione - def.pptx
@@ -289,7 +289,7 @@
           <a:p>
             <a:fld id="{0914D3B2-4EE6-476D-8EC9-0B9A2CDA4F7D}" type="slidenum">
               <a:rPr lang="it-IT" smtClean="0"/>
-              <a:t>‹#›</a:t>
+              <a:t>‹N›</a:t>
             </a:fld>
             <a:endParaRPr lang="it-IT"/>
           </a:p>
@@ -459,7 +459,7 @@
           <a:p>
             <a:fld id="{0914D3B2-4EE6-476D-8EC9-0B9A2CDA4F7D}" type="slidenum">
               <a:rPr lang="it-IT" smtClean="0"/>
-              <a:t>‹#›</a:t>
+              <a:t>‹N›</a:t>
             </a:fld>
             <a:endParaRPr lang="it-IT"/>
           </a:p>
@@ -639,7 +639,7 @@
           <a:p>
             <a:fld id="{0914D3B2-4EE6-476D-8EC9-0B9A2CDA4F7D}" type="slidenum">
               <a:rPr lang="it-IT" smtClean="0"/>
-              <a:t>‹#›</a:t>
+              <a:t>‹N›</a:t>
             </a:fld>
             <a:endParaRPr lang="it-IT"/>
           </a:p>
@@ -809,7 +809,7 @@
           <a:p>
             <a:fld id="{0914D3B2-4EE6-476D-8EC9-0B9A2CDA4F7D}" type="slidenum">
               <a:rPr lang="it-IT" smtClean="0"/>
-              <a:t>‹#›</a:t>
+              <a:t>‹N›</a:t>
             </a:fld>
             <a:endParaRPr lang="it-IT"/>
           </a:p>
@@ -1055,7 +1055,7 @@
           <a:p>
             <a:fld id="{0914D3B2-4EE6-476D-8EC9-0B9A2CDA4F7D}" type="slidenum">
               <a:rPr lang="it-IT" smtClean="0"/>
-              <a:t>‹#›</a:t>
+              <a:t>‹N›</a:t>
             </a:fld>
             <a:endParaRPr lang="it-IT"/>
           </a:p>
@@ -1287,7 +1287,7 @@
           <a:p>
             <a:fld id="{0914D3B2-4EE6-476D-8EC9-0B9A2CDA4F7D}" type="slidenum">
               <a:rPr lang="it-IT" smtClean="0"/>
-              <a:t>‹#›</a:t>
+              <a:t>‹N›</a:t>
             </a:fld>
             <a:endParaRPr lang="it-IT"/>
           </a:p>
@@ -1654,7 +1654,7 @@
           <a:p>
             <a:fld id="{0914D3B2-4EE6-476D-8EC9-0B9A2CDA4F7D}" type="slidenum">
               <a:rPr lang="it-IT" smtClean="0"/>
-              <a:t>‹#›</a:t>
+              <a:t>‹N›</a:t>
             </a:fld>
             <a:endParaRPr lang="it-IT"/>
           </a:p>
@@ -1772,7 +1772,7 @@
           <a:p>
             <a:fld id="{0914D3B2-4EE6-476D-8EC9-0B9A2CDA4F7D}" type="slidenum">
               <a:rPr lang="it-IT" smtClean="0"/>
-              <a:t>‹#›</a:t>
+              <a:t>‹N›</a:t>
             </a:fld>
             <a:endParaRPr lang="it-IT"/>
           </a:p>
@@ -1867,7 +1867,7 @@
           <a:p>
             <a:fld id="{0914D3B2-4EE6-476D-8EC9-0B9A2CDA4F7D}" type="slidenum">
               <a:rPr lang="it-IT" smtClean="0"/>
-              <a:t>‹#›</a:t>
+              <a:t>‹N›</a:t>
             </a:fld>
             <a:endParaRPr lang="it-IT"/>
           </a:p>
@@ -2144,7 +2144,7 @@
           <a:p>
             <a:fld id="{0914D3B2-4EE6-476D-8EC9-0B9A2CDA4F7D}" type="slidenum">
               <a:rPr lang="it-IT" smtClean="0"/>
-              <a:t>‹#›</a:t>
+              <a:t>‹N›</a:t>
             </a:fld>
             <a:endParaRPr lang="it-IT"/>
           </a:p>
@@ -2401,7 +2401,7 @@
           <a:p>
             <a:fld id="{0914D3B2-4EE6-476D-8EC9-0B9A2CDA4F7D}" type="slidenum">
               <a:rPr lang="it-IT" smtClean="0"/>
-              <a:t>‹#›</a:t>
+              <a:t>‹N›</a:t>
             </a:fld>
             <a:endParaRPr lang="it-IT"/>
           </a:p>
@@ -2662,7 +2662,7 @@
           <a:p>
             <a:fld id="{0914D3B2-4EE6-476D-8EC9-0B9A2CDA4F7D}" type="slidenum">
               <a:rPr lang="it-IT" smtClean="0"/>
-              <a:t>‹#›</a:t>
+              <a:t>‹N›</a:t>
             </a:fld>
             <a:endParaRPr lang="it-IT"/>
           </a:p>
@@ -3389,13 +3389,13 @@
   <p:clrMapOvr>
     <a:masterClrMapping/>
   </p:clrMapOvr>
-  <mc:AlternateContent xmlns:mc="http://schemas.openxmlformats.org/markup-compatibility/2006">
-    <mc:Choice xmlns:p14="http://schemas.microsoft.com/office/powerpoint/2010/main" Requires="p14">
+  <mc:AlternateContent xmlns:mc="http://schemas.openxmlformats.org/markup-compatibility/2006" xmlns:p14="http://schemas.microsoft.com/office/powerpoint/2010/main">
+    <mc:Choice Requires="p14">
       <p:transition spd="slow" p14:dur="3400">
         <p14:reveal/>
       </p:transition>
     </mc:Choice>
-    <mc:Fallback>
+    <mc:Fallback xmlns="">
       <p:transition spd="slow">
         <p:fade/>
       </p:transition>
@@ -3562,13 +3562,13 @@
   <p:clrMapOvr>
     <a:masterClrMapping/>
   </p:clrMapOvr>
-  <mc:AlternateContent xmlns:mc="http://schemas.openxmlformats.org/markup-compatibility/2006">
-    <mc:Choice xmlns:p14="http://schemas.microsoft.com/office/powerpoint/2010/main" Requires="p14">
+  <mc:AlternateContent xmlns:mc="http://schemas.openxmlformats.org/markup-compatibility/2006" xmlns:p14="http://schemas.microsoft.com/office/powerpoint/2010/main">
+    <mc:Choice Requires="p14">
       <p:transition spd="slow" p14:dur="1750">
         <p14:reveal/>
       </p:transition>
     </mc:Choice>
-    <mc:Fallback>
+    <mc:Fallback xmlns="">
       <p:transition spd="slow">
         <p:fade/>
       </p:transition>
@@ -4639,13 +4639,13 @@
   <p:clrMapOvr>
     <a:masterClrMapping/>
   </p:clrMapOvr>
-  <mc:AlternateContent xmlns:mc="http://schemas.openxmlformats.org/markup-compatibility/2006">
-    <mc:Choice xmlns:p14="http://schemas.microsoft.com/office/powerpoint/2010/main" Requires="p14">
+  <mc:AlternateContent xmlns:mc="http://schemas.openxmlformats.org/markup-compatibility/2006" xmlns:p14="http://schemas.microsoft.com/office/powerpoint/2010/main">
+    <mc:Choice Requires="p14">
       <p:transition spd="med" p14:dur="700">
         <p:fade/>
       </p:transition>
     </mc:Choice>
-    <mc:Fallback>
+    <mc:Fallback xmlns="">
       <p:transition spd="med">
         <p:fade/>
       </p:transition>
@@ -4726,11 +4726,8 @@
             </a:r>
             <a:r>
               <a:rPr lang="it-IT" dirty="0"/>
-              <a:t>e sottocategorie, alcune delle quali create ad-hoc per mettere in evidenza, ad esempio, oggetti appetibili per l’utente</a:t>
-            </a:r>
-          </a:p>
-          <a:p>
-            <a:endParaRPr lang="it-IT" dirty="0"/>
+              <a:t>e sottocategorie che raggruppano oggetti di una determinata tipologia</a:t>
+            </a:r>
           </a:p>
         </p:txBody>
       </p:sp>
@@ -5176,13 +5173,13 @@
   <p:clrMapOvr>
     <a:masterClrMapping/>
   </p:clrMapOvr>
-  <mc:AlternateContent xmlns:mc="http://schemas.openxmlformats.org/markup-compatibility/2006">
-    <mc:Choice xmlns:p14="http://schemas.microsoft.com/office/powerpoint/2010/main" Requires="p14">
+  <mc:AlternateContent xmlns:mc="http://schemas.openxmlformats.org/markup-compatibility/2006" xmlns:p14="http://schemas.microsoft.com/office/powerpoint/2010/main">
+    <mc:Choice Requires="p14">
       <p:transition spd="med" p14:dur="700">
         <p:fade/>
       </p:transition>
     </mc:Choice>
-    <mc:Fallback>
+    <mc:Fallback xmlns="">
       <p:transition spd="med">
         <p:fade/>
       </p:transition>
@@ -5272,7 +5269,7 @@
         </p:blipFill>
         <p:spPr>
           <a:xfrm>
-            <a:off x="1252505" y="1507330"/>
+            <a:off x="1255878" y="1528007"/>
             <a:ext cx="2203315" cy="3917005"/>
           </a:xfrm>
           <a:prstGeom prst="rect">
@@ -5294,8 +5291,8 @@
         </p:nvSpPr>
         <p:spPr>
           <a:xfrm>
-            <a:off x="5885303" y="1276497"/>
-            <a:ext cx="5772150" cy="461665"/>
+            <a:off x="5489214" y="770928"/>
+            <a:ext cx="6449682" cy="3416320"/>
           </a:xfrm>
           <a:prstGeom prst="rect">
             <a:avLst/>
@@ -5308,13 +5305,16 @@
           </a:bodyPr>
           <a:lstStyle/>
           <a:p>
+            <a:endParaRPr lang="en-US" sz="2400" dirty="0"/>
+          </a:p>
+          <a:p>
             <a:pPr marL="342900" indent="-342900">
               <a:buFont typeface="Arial" panose="020B0604020202020204" pitchFamily="34" charset="0"/>
               <a:buChar char="•"/>
             </a:pPr>
             <a:r>
               <a:rPr lang="en-US" sz="2400" dirty="0" err="1"/>
-              <a:t>Inserire</a:t>
+              <a:t>Ricercando</a:t>
             </a:r>
             <a:r>
               <a:rPr lang="en-US" sz="2400" dirty="0"/>
@@ -5322,23 +5322,601 @@
             </a:r>
             <a:r>
               <a:rPr lang="en-US" sz="2400" dirty="0" err="1"/>
-              <a:t>il</a:t>
+              <a:t>mediante</a:t>
+            </a:r>
+            <a:r>
+              <a:rPr lang="en-US" sz="2400" dirty="0"/>
+              <a:t> una </a:t>
+            </a:r>
+            <a:r>
+              <a:rPr lang="en-US" sz="2400" dirty="0" err="1"/>
+              <a:t>deteminata</a:t>
             </a:r>
             <a:r>
               <a:rPr lang="en-US" sz="2400" dirty="0"/>
               <a:t> </a:t>
             </a:r>
             <a:r>
+              <a:rPr lang="en-US" sz="2400" b="1" dirty="0" err="1"/>
+              <a:t>categoria</a:t>
+            </a:r>
+            <a:r>
+              <a:rPr lang="en-US" sz="2400" b="1" dirty="0"/>
+              <a:t> </a:t>
+            </a:r>
+            <a:r>
+              <a:rPr lang="en-US" sz="2400" b="1" dirty="0" err="1"/>
+              <a:t>l’utente</a:t>
+            </a:r>
+            <a:r>
+              <a:rPr lang="en-US" sz="2400" b="1" dirty="0"/>
+              <a:t> </a:t>
+            </a:r>
+            <a:r>
+              <a:rPr lang="en-US" sz="2400" b="1" dirty="0" err="1"/>
+              <a:t>potrà</a:t>
+            </a:r>
+            <a:r>
+              <a:rPr lang="en-US" sz="2400" b="1" dirty="0"/>
+              <a:t>: </a:t>
+            </a:r>
+          </a:p>
+          <a:p>
+            <a:pPr marL="1257300" lvl="2" indent="-342900">
+              <a:buFont typeface="Arial" panose="020B0604020202020204" pitchFamily="34" charset="0"/>
+              <a:buChar char="•"/>
+            </a:pPr>
+            <a:r>
               <a:rPr lang="en-US" sz="2400" dirty="0" err="1"/>
-              <a:t>testo</a:t>
+              <a:t>visualizzare</a:t>
             </a:r>
             <a:r>
               <a:rPr lang="en-US" sz="2400" dirty="0"/>
-              <a:t> qui </a:t>
-            </a:r>
-          </a:p>
-        </p:txBody>
-      </p:sp>
+              <a:t> </a:t>
+            </a:r>
+            <a:r>
+              <a:rPr lang="en-US" sz="2400" dirty="0" err="1"/>
+              <a:t>gli</a:t>
+            </a:r>
+            <a:r>
+              <a:rPr lang="en-US" sz="2400" dirty="0"/>
+              <a:t> </a:t>
+            </a:r>
+            <a:r>
+              <a:rPr lang="en-US" sz="2400" dirty="0" err="1"/>
+              <a:t>oggetti</a:t>
+            </a:r>
+            <a:r>
+              <a:rPr lang="en-US" sz="2400" dirty="0"/>
+              <a:t> </a:t>
+            </a:r>
+            <a:r>
+              <a:rPr lang="en-US" sz="2400" dirty="0" err="1"/>
+              <a:t>appartenenti</a:t>
+            </a:r>
+            <a:r>
+              <a:rPr lang="en-US" sz="2400" dirty="0"/>
+              <a:t> </a:t>
+            </a:r>
+            <a:r>
+              <a:rPr lang="en-US" sz="2400" dirty="0" err="1"/>
+              <a:t>alla</a:t>
+            </a:r>
+            <a:r>
+              <a:rPr lang="en-US" sz="2400" dirty="0"/>
+              <a:t> </a:t>
+            </a:r>
+            <a:r>
+              <a:rPr lang="en-US" sz="2400" dirty="0" err="1"/>
+              <a:t>selezione</a:t>
+            </a:r>
+            <a:r>
+              <a:rPr lang="en-US" sz="2400" dirty="0"/>
+              <a:t> </a:t>
+            </a:r>
+            <a:r>
+              <a:rPr lang="en-US" sz="2400" dirty="0" err="1"/>
+              <a:t>effettuata</a:t>
+            </a:r>
+            <a:endParaRPr lang="en-US" sz="2400" dirty="0"/>
+          </a:p>
+          <a:p>
+            <a:pPr marL="1257300" lvl="2" indent="-342900">
+              <a:buFont typeface="Arial" panose="020B0604020202020204" pitchFamily="34" charset="0"/>
+              <a:buChar char="•"/>
+            </a:pPr>
+            <a:r>
+              <a:rPr lang="en-US" sz="2400" dirty="0" err="1"/>
+              <a:t>Scegliere</a:t>
+            </a:r>
+            <a:r>
+              <a:rPr lang="en-US" sz="2400" dirty="0"/>
+              <a:t> </a:t>
+            </a:r>
+            <a:r>
+              <a:rPr lang="en-US" sz="2400" dirty="0" err="1"/>
+              <a:t>tra</a:t>
+            </a:r>
+            <a:r>
+              <a:rPr lang="en-US" sz="2400" dirty="0"/>
+              <a:t> diverse </a:t>
+            </a:r>
+            <a:r>
+              <a:rPr lang="en-US" sz="2400" b="1" dirty="0" err="1"/>
+              <a:t>sottocategorie</a:t>
+            </a:r>
+            <a:endParaRPr lang="en-US" sz="2400" b="1" dirty="0"/>
+          </a:p>
+          <a:p>
+            <a:pPr marL="1257300" lvl="2" indent="-342900">
+              <a:buFont typeface="Arial" panose="020B0604020202020204" pitchFamily="34" charset="0"/>
+              <a:buChar char="•"/>
+            </a:pPr>
+            <a:endParaRPr lang="en-US" sz="2400" b="1" dirty="0"/>
+          </a:p>
+          <a:p>
+            <a:pPr marL="342900" indent="-342900">
+              <a:buFont typeface="Arial" panose="020B0604020202020204" pitchFamily="34" charset="0"/>
+              <a:buChar char="•"/>
+            </a:pPr>
+            <a:r>
+              <a:rPr lang="en-US" sz="2400" dirty="0" err="1"/>
+              <a:t>Selezionando</a:t>
+            </a:r>
+            <a:r>
+              <a:rPr lang="en-US" sz="2400" dirty="0"/>
+              <a:t> una </a:t>
+            </a:r>
+            <a:r>
+              <a:rPr lang="en-US" sz="2400" b="1" dirty="0" err="1"/>
+              <a:t>sottocategoria</a:t>
+            </a:r>
+            <a:r>
+              <a:rPr lang="en-US" sz="2400" b="1" dirty="0"/>
+              <a:t> </a:t>
+            </a:r>
+            <a:r>
+              <a:rPr lang="en-US" sz="2400" dirty="0"/>
+              <a:t>la </a:t>
+            </a:r>
+            <a:r>
+              <a:rPr lang="en-US" sz="2400" dirty="0" err="1"/>
+              <a:t>ricerca</a:t>
+            </a:r>
+            <a:r>
+              <a:rPr lang="en-US" sz="2400" dirty="0"/>
+              <a:t> </a:t>
+            </a:r>
+            <a:r>
+              <a:rPr lang="en-US" sz="2400" dirty="0" err="1"/>
+              <a:t>diventerà</a:t>
+            </a:r>
+            <a:r>
+              <a:rPr lang="en-US" sz="2400" dirty="0"/>
+              <a:t> </a:t>
+            </a:r>
+            <a:r>
+              <a:rPr lang="en-US" sz="2400" dirty="0" err="1"/>
+              <a:t>sempre</a:t>
+            </a:r>
+            <a:r>
+              <a:rPr lang="en-US" sz="2400" dirty="0"/>
+              <a:t> </a:t>
+            </a:r>
+            <a:r>
+              <a:rPr lang="en-US" sz="2400" dirty="0" err="1"/>
+              <a:t>più</a:t>
+            </a:r>
+            <a:r>
+              <a:rPr lang="en-US" sz="2400" dirty="0"/>
+              <a:t> </a:t>
+            </a:r>
+            <a:r>
+              <a:rPr lang="en-US" sz="2400" dirty="0" err="1"/>
+              <a:t>specifica</a:t>
+            </a:r>
+            <a:endParaRPr lang="en-US" sz="2400" dirty="0"/>
+          </a:p>
+        </p:txBody>
+      </p:sp>
+      <p:sp>
+        <p:nvSpPr>
+          <p:cNvPr id="6" name="Rectangle 64">
+            <a:extLst>
+              <a:ext uri="{FF2B5EF4-FFF2-40B4-BE49-F238E27FC236}">
+                <a16:creationId xmlns:a16="http://schemas.microsoft.com/office/drawing/2014/main" id="{79C05BE5-A284-4FC1-9ED0-9B63617C77CB}"/>
+              </a:ext>
+            </a:extLst>
+          </p:cNvPr>
+          <p:cNvSpPr/>
+          <p:nvPr/>
+        </p:nvSpPr>
+        <p:spPr>
+          <a:xfrm>
+            <a:off x="1731042" y="2897915"/>
+            <a:ext cx="425562" cy="155836"/>
+          </a:xfrm>
+          <a:prstGeom prst="rect">
+            <a:avLst/>
+          </a:prstGeom>
+          <a:noFill/>
+          <a:ln w="28575">
+            <a:solidFill>
+              <a:srgbClr val="C00000"/>
+            </a:solidFill>
+          </a:ln>
+        </p:spPr>
+        <p:style>
+          <a:lnRef idx="2">
+            <a:schemeClr val="accent1">
+              <a:shade val="50000"/>
+            </a:schemeClr>
+          </a:lnRef>
+          <a:fillRef idx="1">
+            <a:schemeClr val="accent1"/>
+          </a:fillRef>
+          <a:effectRef idx="0">
+            <a:schemeClr val="accent1"/>
+          </a:effectRef>
+          <a:fontRef idx="minor">
+            <a:schemeClr val="lt1"/>
+          </a:fontRef>
+        </p:style>
+        <p:txBody>
+          <a:bodyPr rtlCol="0" anchor="ctr"/>
+          <a:lstStyle/>
+          <a:p>
+            <a:pPr algn="ctr"/>
+            <a:endParaRPr lang="en-US"/>
+          </a:p>
+        </p:txBody>
+      </p:sp>
+      <p:cxnSp>
+        <p:nvCxnSpPr>
+          <p:cNvPr id="7" name="Straight Connector 71">
+            <a:extLst>
+              <a:ext uri="{FF2B5EF4-FFF2-40B4-BE49-F238E27FC236}">
+                <a16:creationId xmlns:a16="http://schemas.microsoft.com/office/drawing/2014/main" id="{957B02DA-8F01-437C-A601-006BA6CA4687}"/>
+              </a:ext>
+            </a:extLst>
+          </p:cNvPr>
+          <p:cNvCxnSpPr>
+            <a:cxnSpLocks/>
+          </p:cNvCxnSpPr>
+          <p:nvPr/>
+        </p:nvCxnSpPr>
+        <p:spPr>
+          <a:xfrm flipH="1">
+            <a:off x="2058839" y="3341299"/>
+            <a:ext cx="2800708" cy="0"/>
+          </a:xfrm>
+          <a:prstGeom prst="line">
+            <a:avLst/>
+          </a:prstGeom>
+          <a:ln w="28575">
+            <a:solidFill>
+              <a:srgbClr val="C00000"/>
+            </a:solidFill>
+          </a:ln>
+        </p:spPr>
+        <p:style>
+          <a:lnRef idx="1">
+            <a:schemeClr val="accent1"/>
+          </a:lnRef>
+          <a:fillRef idx="0">
+            <a:schemeClr val="accent1"/>
+          </a:fillRef>
+          <a:effectRef idx="0">
+            <a:schemeClr val="accent1"/>
+          </a:effectRef>
+          <a:fontRef idx="minor">
+            <a:schemeClr val="tx1"/>
+          </a:fontRef>
+        </p:style>
+      </p:cxnSp>
+      <p:cxnSp>
+        <p:nvCxnSpPr>
+          <p:cNvPr id="9" name="Connettore diritto 8">
+            <a:extLst>
+              <a:ext uri="{FF2B5EF4-FFF2-40B4-BE49-F238E27FC236}">
+                <a16:creationId xmlns:a16="http://schemas.microsoft.com/office/drawing/2014/main" id="{AA5018FB-E0F7-4DB3-9AC9-A88B83726052}"/>
+              </a:ext>
+            </a:extLst>
+          </p:cNvPr>
+          <p:cNvCxnSpPr>
+            <a:cxnSpLocks/>
+          </p:cNvCxnSpPr>
+          <p:nvPr/>
+        </p:nvCxnSpPr>
+        <p:spPr>
+          <a:xfrm>
+            <a:off x="2058839" y="3053751"/>
+            <a:ext cx="0" cy="287548"/>
+          </a:xfrm>
+          <a:prstGeom prst="line">
+            <a:avLst/>
+          </a:prstGeom>
+          <a:ln w="28575"/>
+        </p:spPr>
+        <p:style>
+          <a:lnRef idx="3">
+            <a:schemeClr val="accent5"/>
+          </a:lnRef>
+          <a:fillRef idx="0">
+            <a:schemeClr val="accent5"/>
+          </a:fillRef>
+          <a:effectRef idx="2">
+            <a:schemeClr val="accent5"/>
+          </a:effectRef>
+          <a:fontRef idx="minor">
+            <a:schemeClr val="tx1"/>
+          </a:fontRef>
+        </p:style>
+      </p:cxnSp>
+      <p:cxnSp>
+        <p:nvCxnSpPr>
+          <p:cNvPr id="22" name="Connettore diritto 21">
+            <a:extLst>
+              <a:ext uri="{FF2B5EF4-FFF2-40B4-BE49-F238E27FC236}">
+                <a16:creationId xmlns:a16="http://schemas.microsoft.com/office/drawing/2014/main" id="{F64C827F-46CD-48DA-B745-93FAF471357B}"/>
+              </a:ext>
+            </a:extLst>
+          </p:cNvPr>
+          <p:cNvCxnSpPr>
+            <a:cxnSpLocks/>
+          </p:cNvCxnSpPr>
+          <p:nvPr/>
+        </p:nvCxnSpPr>
+        <p:spPr>
+          <a:xfrm>
+            <a:off x="4859547" y="3329796"/>
+            <a:ext cx="0" cy="209910"/>
+          </a:xfrm>
+          <a:prstGeom prst="line">
+            <a:avLst/>
+          </a:prstGeom>
+          <a:ln w="28575"/>
+        </p:spPr>
+        <p:style>
+          <a:lnRef idx="3">
+            <a:schemeClr val="accent5"/>
+          </a:lnRef>
+          <a:fillRef idx="0">
+            <a:schemeClr val="accent5"/>
+          </a:fillRef>
+          <a:effectRef idx="2">
+            <a:schemeClr val="accent5"/>
+          </a:effectRef>
+          <a:fontRef idx="minor">
+            <a:schemeClr val="tx1"/>
+          </a:fontRef>
+        </p:style>
+      </p:cxnSp>
+      <p:cxnSp>
+        <p:nvCxnSpPr>
+          <p:cNvPr id="24" name="Straight Connector 71">
+            <a:extLst>
+              <a:ext uri="{FF2B5EF4-FFF2-40B4-BE49-F238E27FC236}">
+                <a16:creationId xmlns:a16="http://schemas.microsoft.com/office/drawing/2014/main" id="{BE37083A-0744-4549-80BB-BAA0FCB0C591}"/>
+              </a:ext>
+            </a:extLst>
+          </p:cNvPr>
+          <p:cNvCxnSpPr>
+            <a:cxnSpLocks/>
+          </p:cNvCxnSpPr>
+          <p:nvPr/>
+        </p:nvCxnSpPr>
+        <p:spPr>
+          <a:xfrm flipH="1" flipV="1">
+            <a:off x="4859547" y="3539706"/>
+            <a:ext cx="741873" cy="2876"/>
+          </a:xfrm>
+          <a:prstGeom prst="line">
+            <a:avLst/>
+          </a:prstGeom>
+          <a:ln w="28575">
+            <a:solidFill>
+              <a:srgbClr val="C00000"/>
+            </a:solidFill>
+          </a:ln>
+        </p:spPr>
+        <p:style>
+          <a:lnRef idx="1">
+            <a:schemeClr val="accent1"/>
+          </a:lnRef>
+          <a:fillRef idx="0">
+            <a:schemeClr val="accent1"/>
+          </a:fillRef>
+          <a:effectRef idx="0">
+            <a:schemeClr val="accent1"/>
+          </a:effectRef>
+          <a:fontRef idx="minor">
+            <a:schemeClr val="tx1"/>
+          </a:fontRef>
+        </p:style>
+      </p:cxnSp>
+      <p:sp>
+        <p:nvSpPr>
+          <p:cNvPr id="30" name="Rectangle 14">
+            <a:extLst>
+              <a:ext uri="{FF2B5EF4-FFF2-40B4-BE49-F238E27FC236}">
+                <a16:creationId xmlns:a16="http://schemas.microsoft.com/office/drawing/2014/main" id="{8B4B65EB-575F-4805-BC6A-80F1417D5FC3}"/>
+              </a:ext>
+            </a:extLst>
+          </p:cNvPr>
+          <p:cNvSpPr/>
+          <p:nvPr/>
+        </p:nvSpPr>
+        <p:spPr>
+          <a:xfrm>
+            <a:off x="1305480" y="4031412"/>
+            <a:ext cx="385297" cy="155836"/>
+          </a:xfrm>
+          <a:prstGeom prst="rect">
+            <a:avLst/>
+          </a:prstGeom>
+          <a:noFill/>
+          <a:ln w="28575">
+            <a:solidFill>
+              <a:srgbClr val="0070C0"/>
+            </a:solidFill>
+          </a:ln>
+        </p:spPr>
+        <p:style>
+          <a:lnRef idx="2">
+            <a:schemeClr val="accent1">
+              <a:shade val="50000"/>
+            </a:schemeClr>
+          </a:lnRef>
+          <a:fillRef idx="1">
+            <a:schemeClr val="accent1"/>
+          </a:fillRef>
+          <a:effectRef idx="0">
+            <a:schemeClr val="accent1"/>
+          </a:effectRef>
+          <a:fontRef idx="minor">
+            <a:schemeClr val="lt1"/>
+          </a:fontRef>
+        </p:style>
+        <p:txBody>
+          <a:bodyPr rtlCol="0" anchor="ctr"/>
+          <a:lstStyle/>
+          <a:p>
+            <a:pPr algn="ctr"/>
+            <a:endParaRPr lang="en-US"/>
+          </a:p>
+        </p:txBody>
+      </p:sp>
+      <p:cxnSp>
+        <p:nvCxnSpPr>
+          <p:cNvPr id="31" name="Straight Connector 19">
+            <a:extLst>
+              <a:ext uri="{FF2B5EF4-FFF2-40B4-BE49-F238E27FC236}">
+                <a16:creationId xmlns:a16="http://schemas.microsoft.com/office/drawing/2014/main" id="{201E950F-AF59-41EA-A0CA-3A9FC40B7BD5}"/>
+              </a:ext>
+            </a:extLst>
+          </p:cNvPr>
+          <p:cNvCxnSpPr>
+            <a:cxnSpLocks/>
+            <a:endCxn id="30" idx="1"/>
+          </p:cNvCxnSpPr>
+          <p:nvPr/>
+        </p:nvCxnSpPr>
+        <p:spPr>
+          <a:xfrm flipV="1">
+            <a:off x="399461" y="4109330"/>
+            <a:ext cx="906019" cy="9318"/>
+          </a:xfrm>
+          <a:prstGeom prst="line">
+            <a:avLst/>
+          </a:prstGeom>
+          <a:ln w="28575">
+            <a:solidFill>
+              <a:srgbClr val="0070C0"/>
+            </a:solidFill>
+          </a:ln>
+        </p:spPr>
+        <p:style>
+          <a:lnRef idx="1">
+            <a:schemeClr val="accent1"/>
+          </a:lnRef>
+          <a:fillRef idx="0">
+            <a:schemeClr val="accent1"/>
+          </a:fillRef>
+          <a:effectRef idx="0">
+            <a:schemeClr val="accent1"/>
+          </a:effectRef>
+          <a:fontRef idx="minor">
+            <a:schemeClr val="tx1"/>
+          </a:fontRef>
+        </p:style>
+      </p:cxnSp>
+      <p:cxnSp>
+        <p:nvCxnSpPr>
+          <p:cNvPr id="34" name="Straight Connector 19">
+            <a:extLst>
+              <a:ext uri="{FF2B5EF4-FFF2-40B4-BE49-F238E27FC236}">
+                <a16:creationId xmlns:a16="http://schemas.microsoft.com/office/drawing/2014/main" id="{EC9C7A5E-AC4F-4F32-B909-B2B32A77A03C}"/>
+              </a:ext>
+            </a:extLst>
+          </p:cNvPr>
+          <p:cNvCxnSpPr>
+            <a:cxnSpLocks/>
+          </p:cNvCxnSpPr>
+          <p:nvPr/>
+        </p:nvCxnSpPr>
+        <p:spPr>
+          <a:xfrm>
+            <a:off x="399461" y="1334219"/>
+            <a:ext cx="0" cy="2775111"/>
+          </a:xfrm>
+          <a:prstGeom prst="line">
+            <a:avLst/>
+          </a:prstGeom>
+          <a:ln w="28575">
+            <a:solidFill>
+              <a:srgbClr val="0070C0"/>
+            </a:solidFill>
+          </a:ln>
+        </p:spPr>
+        <p:style>
+          <a:lnRef idx="1">
+            <a:schemeClr val="accent1"/>
+          </a:lnRef>
+          <a:fillRef idx="0">
+            <a:schemeClr val="accent1"/>
+          </a:fillRef>
+          <a:effectRef idx="0">
+            <a:schemeClr val="accent1"/>
+          </a:effectRef>
+          <a:fontRef idx="minor">
+            <a:schemeClr val="tx1"/>
+          </a:fontRef>
+        </p:style>
+      </p:cxnSp>
+      <p:cxnSp>
+        <p:nvCxnSpPr>
+          <p:cNvPr id="37" name="Straight Connector 19">
+            <a:extLst>
+              <a:ext uri="{FF2B5EF4-FFF2-40B4-BE49-F238E27FC236}">
+                <a16:creationId xmlns:a16="http://schemas.microsoft.com/office/drawing/2014/main" id="{4AF44947-02DB-4B02-BA2A-6B1CFE1814DC}"/>
+              </a:ext>
+            </a:extLst>
+          </p:cNvPr>
+          <p:cNvCxnSpPr>
+            <a:cxnSpLocks/>
+          </p:cNvCxnSpPr>
+          <p:nvPr/>
+        </p:nvCxnSpPr>
+        <p:spPr>
+          <a:xfrm>
+            <a:off x="399461" y="1334219"/>
+            <a:ext cx="5178954" cy="0"/>
+          </a:xfrm>
+          <a:prstGeom prst="line">
+            <a:avLst/>
+          </a:prstGeom>
+          <a:ln w="28575">
+            <a:solidFill>
+              <a:srgbClr val="0070C0"/>
+            </a:solidFill>
+          </a:ln>
+        </p:spPr>
+        <p:style>
+          <a:lnRef idx="1">
+            <a:schemeClr val="accent1"/>
+          </a:lnRef>
+          <a:fillRef idx="0">
+            <a:schemeClr val="accent1"/>
+          </a:fillRef>
+          <a:effectRef idx="0">
+            <a:schemeClr val="accent1"/>
+          </a:effectRef>
+          <a:fontRef idx="minor">
+            <a:schemeClr val="tx1"/>
+          </a:fontRef>
+        </p:style>
+      </p:cxnSp>
     </p:spTree>
     <p:extLst>
       <p:ext uri="{BB962C8B-B14F-4D97-AF65-F5344CB8AC3E}">
@@ -5349,13 +5927,13 @@
   <p:clrMapOvr>
     <a:masterClrMapping/>
   </p:clrMapOvr>
-  <mc:AlternateContent xmlns:mc="http://schemas.openxmlformats.org/markup-compatibility/2006">
-    <mc:Choice xmlns:p14="http://schemas.microsoft.com/office/powerpoint/2010/main" Requires="p14">
+  <mc:AlternateContent xmlns:mc="http://schemas.openxmlformats.org/markup-compatibility/2006" xmlns:p14="http://schemas.microsoft.com/office/powerpoint/2010/main">
+    <mc:Choice Requires="p14">
       <p:transition spd="med" p14:dur="700">
         <p:fade/>
       </p:transition>
     </mc:Choice>
-    <mc:Fallback>
+    <mc:Fallback xmlns="">
       <p:transition spd="med">
         <p:fade/>
       </p:transition>

</xml_diff>

<commit_message>
Migliorata la stilistica del testo, eliminata la versione obsoleta del pdf, esportato il progetto come pdf
</commit_message>
<xml_diff>
--- a/mockup/presentazione - def.pptx
+++ b/mockup/presentazione - def.pptx
@@ -10,6 +10,7 @@
     <p:sldId id="258" r:id="rId4"/>
     <p:sldId id="260" r:id="rId5"/>
     <p:sldId id="259" r:id="rId6"/>
+    <p:sldId id="261" r:id="rId7"/>
   </p:sldIdLst>
   <p:sldSz cx="12192000" cy="6858000"/>
   <p:notesSz cx="6858000" cy="9144000"/>
@@ -247,7 +248,7 @@
           <a:p>
             <a:fld id="{AC1E7671-E8C1-4C57-B64D-652DD43A332D}" type="datetimeFigureOut">
               <a:rPr lang="it-IT" smtClean="0"/>
-              <a:t>20/10/2018</a:t>
+              <a:t>21/10/2018</a:t>
             </a:fld>
             <a:endParaRPr lang="it-IT"/>
           </a:p>
@@ -289,7 +290,7 @@
           <a:p>
             <a:fld id="{0914D3B2-4EE6-476D-8EC9-0B9A2CDA4F7D}" type="slidenum">
               <a:rPr lang="it-IT" smtClean="0"/>
-              <a:t>‹N›</a:t>
+              <a:t>‹#›</a:t>
             </a:fld>
             <a:endParaRPr lang="it-IT"/>
           </a:p>
@@ -417,7 +418,7 @@
           <a:p>
             <a:fld id="{AC1E7671-E8C1-4C57-B64D-652DD43A332D}" type="datetimeFigureOut">
               <a:rPr lang="it-IT" smtClean="0"/>
-              <a:t>20/10/2018</a:t>
+              <a:t>21/10/2018</a:t>
             </a:fld>
             <a:endParaRPr lang="it-IT"/>
           </a:p>
@@ -459,7 +460,7 @@
           <a:p>
             <a:fld id="{0914D3B2-4EE6-476D-8EC9-0B9A2CDA4F7D}" type="slidenum">
               <a:rPr lang="it-IT" smtClean="0"/>
-              <a:t>‹N›</a:t>
+              <a:t>‹#›</a:t>
             </a:fld>
             <a:endParaRPr lang="it-IT"/>
           </a:p>
@@ -597,7 +598,7 @@
           <a:p>
             <a:fld id="{AC1E7671-E8C1-4C57-B64D-652DD43A332D}" type="datetimeFigureOut">
               <a:rPr lang="it-IT" smtClean="0"/>
-              <a:t>20/10/2018</a:t>
+              <a:t>21/10/2018</a:t>
             </a:fld>
             <a:endParaRPr lang="it-IT"/>
           </a:p>
@@ -639,7 +640,7 @@
           <a:p>
             <a:fld id="{0914D3B2-4EE6-476D-8EC9-0B9A2CDA4F7D}" type="slidenum">
               <a:rPr lang="it-IT" smtClean="0"/>
-              <a:t>‹N›</a:t>
+              <a:t>‹#›</a:t>
             </a:fld>
             <a:endParaRPr lang="it-IT"/>
           </a:p>
@@ -767,7 +768,7 @@
           <a:p>
             <a:fld id="{AC1E7671-E8C1-4C57-B64D-652DD43A332D}" type="datetimeFigureOut">
               <a:rPr lang="it-IT" smtClean="0"/>
-              <a:t>20/10/2018</a:t>
+              <a:t>21/10/2018</a:t>
             </a:fld>
             <a:endParaRPr lang="it-IT"/>
           </a:p>
@@ -809,7 +810,7 @@
           <a:p>
             <a:fld id="{0914D3B2-4EE6-476D-8EC9-0B9A2CDA4F7D}" type="slidenum">
               <a:rPr lang="it-IT" smtClean="0"/>
-              <a:t>‹N›</a:t>
+              <a:t>‹#›</a:t>
             </a:fld>
             <a:endParaRPr lang="it-IT"/>
           </a:p>
@@ -1013,7 +1014,7 @@
           <a:p>
             <a:fld id="{AC1E7671-E8C1-4C57-B64D-652DD43A332D}" type="datetimeFigureOut">
               <a:rPr lang="it-IT" smtClean="0"/>
-              <a:t>20/10/2018</a:t>
+              <a:t>21/10/2018</a:t>
             </a:fld>
             <a:endParaRPr lang="it-IT"/>
           </a:p>
@@ -1055,7 +1056,7 @@
           <a:p>
             <a:fld id="{0914D3B2-4EE6-476D-8EC9-0B9A2CDA4F7D}" type="slidenum">
               <a:rPr lang="it-IT" smtClean="0"/>
-              <a:t>‹N›</a:t>
+              <a:t>‹#›</a:t>
             </a:fld>
             <a:endParaRPr lang="it-IT"/>
           </a:p>
@@ -1245,7 +1246,7 @@
           <a:p>
             <a:fld id="{AC1E7671-E8C1-4C57-B64D-652DD43A332D}" type="datetimeFigureOut">
               <a:rPr lang="it-IT" smtClean="0"/>
-              <a:t>20/10/2018</a:t>
+              <a:t>21/10/2018</a:t>
             </a:fld>
             <a:endParaRPr lang="it-IT"/>
           </a:p>
@@ -1287,7 +1288,7 @@
           <a:p>
             <a:fld id="{0914D3B2-4EE6-476D-8EC9-0B9A2CDA4F7D}" type="slidenum">
               <a:rPr lang="it-IT" smtClean="0"/>
-              <a:t>‹N›</a:t>
+              <a:t>‹#›</a:t>
             </a:fld>
             <a:endParaRPr lang="it-IT"/>
           </a:p>
@@ -1612,7 +1613,7 @@
           <a:p>
             <a:fld id="{AC1E7671-E8C1-4C57-B64D-652DD43A332D}" type="datetimeFigureOut">
               <a:rPr lang="it-IT" smtClean="0"/>
-              <a:t>20/10/2018</a:t>
+              <a:t>21/10/2018</a:t>
             </a:fld>
             <a:endParaRPr lang="it-IT"/>
           </a:p>
@@ -1654,7 +1655,7 @@
           <a:p>
             <a:fld id="{0914D3B2-4EE6-476D-8EC9-0B9A2CDA4F7D}" type="slidenum">
               <a:rPr lang="it-IT" smtClean="0"/>
-              <a:t>‹N›</a:t>
+              <a:t>‹#›</a:t>
             </a:fld>
             <a:endParaRPr lang="it-IT"/>
           </a:p>
@@ -1730,7 +1731,7 @@
           <a:p>
             <a:fld id="{AC1E7671-E8C1-4C57-B64D-652DD43A332D}" type="datetimeFigureOut">
               <a:rPr lang="it-IT" smtClean="0"/>
-              <a:t>20/10/2018</a:t>
+              <a:t>21/10/2018</a:t>
             </a:fld>
             <a:endParaRPr lang="it-IT"/>
           </a:p>
@@ -1772,7 +1773,7 @@
           <a:p>
             <a:fld id="{0914D3B2-4EE6-476D-8EC9-0B9A2CDA4F7D}" type="slidenum">
               <a:rPr lang="it-IT" smtClean="0"/>
-              <a:t>‹N›</a:t>
+              <a:t>‹#›</a:t>
             </a:fld>
             <a:endParaRPr lang="it-IT"/>
           </a:p>
@@ -1825,7 +1826,7 @@
           <a:p>
             <a:fld id="{AC1E7671-E8C1-4C57-B64D-652DD43A332D}" type="datetimeFigureOut">
               <a:rPr lang="it-IT" smtClean="0"/>
-              <a:t>20/10/2018</a:t>
+              <a:t>21/10/2018</a:t>
             </a:fld>
             <a:endParaRPr lang="it-IT"/>
           </a:p>
@@ -1867,7 +1868,7 @@
           <a:p>
             <a:fld id="{0914D3B2-4EE6-476D-8EC9-0B9A2CDA4F7D}" type="slidenum">
               <a:rPr lang="it-IT" smtClean="0"/>
-              <a:t>‹N›</a:t>
+              <a:t>‹#›</a:t>
             </a:fld>
             <a:endParaRPr lang="it-IT"/>
           </a:p>
@@ -2102,7 +2103,7 @@
           <a:p>
             <a:fld id="{AC1E7671-E8C1-4C57-B64D-652DD43A332D}" type="datetimeFigureOut">
               <a:rPr lang="it-IT" smtClean="0"/>
-              <a:t>20/10/2018</a:t>
+              <a:t>21/10/2018</a:t>
             </a:fld>
             <a:endParaRPr lang="it-IT"/>
           </a:p>
@@ -2144,7 +2145,7 @@
           <a:p>
             <a:fld id="{0914D3B2-4EE6-476D-8EC9-0B9A2CDA4F7D}" type="slidenum">
               <a:rPr lang="it-IT" smtClean="0"/>
-              <a:t>‹N›</a:t>
+              <a:t>‹#›</a:t>
             </a:fld>
             <a:endParaRPr lang="it-IT"/>
           </a:p>
@@ -2359,7 +2360,7 @@
           <a:p>
             <a:fld id="{AC1E7671-E8C1-4C57-B64D-652DD43A332D}" type="datetimeFigureOut">
               <a:rPr lang="it-IT" smtClean="0"/>
-              <a:t>20/10/2018</a:t>
+              <a:t>21/10/2018</a:t>
             </a:fld>
             <a:endParaRPr lang="it-IT"/>
           </a:p>
@@ -2401,7 +2402,7 @@
           <a:p>
             <a:fld id="{0914D3B2-4EE6-476D-8EC9-0B9A2CDA4F7D}" type="slidenum">
               <a:rPr lang="it-IT" smtClean="0"/>
-              <a:t>‹N›</a:t>
+              <a:t>‹#›</a:t>
             </a:fld>
             <a:endParaRPr lang="it-IT"/>
           </a:p>
@@ -2584,7 +2585,7 @@
           <a:p>
             <a:fld id="{AC1E7671-E8C1-4C57-B64D-652DD43A332D}" type="datetimeFigureOut">
               <a:rPr lang="it-IT" smtClean="0"/>
-              <a:t>20/10/2018</a:t>
+              <a:t>21/10/2018</a:t>
             </a:fld>
             <a:endParaRPr lang="it-IT"/>
           </a:p>
@@ -2662,7 +2663,7 @@
           <a:p>
             <a:fld id="{0914D3B2-4EE6-476D-8EC9-0B9A2CDA4F7D}" type="slidenum">
               <a:rPr lang="it-IT" smtClean="0"/>
-              <a:t>‹N›</a:t>
+              <a:t>‹#›</a:t>
             </a:fld>
             <a:endParaRPr lang="it-IT"/>
           </a:p>
@@ -3436,7 +3437,7 @@
         <p:spPr>
           <a:xfrm>
             <a:off x="4632798" y="2314230"/>
-            <a:ext cx="7292502" cy="2585323"/>
+            <a:ext cx="7292502" cy="2954655"/>
           </a:xfrm>
           <a:prstGeom prst="rect">
             <a:avLst/>
@@ -3468,7 +3469,7 @@
             </a:pPr>
             <a:r>
               <a:rPr lang="it-IT" sz="2400" dirty="0"/>
-              <a:t>Intenzione di rivolgersi a privati e professionisti che abbiano bisogno di utilizzare un determinato bene per un breve arco di tempo, evitandone così l’acquisto</a:t>
+              <a:t>Rivolta a privati e professionisti che abbiano bisogno di utilizzare un determinato bene per un breve arco di tempo, evitandone l’acquisto che risulterebbe troppo esoso</a:t>
             </a:r>
           </a:p>
           <a:p>
@@ -4711,18 +4712,26 @@
             <a:pPr lvl="1"/>
             <a:r>
               <a:rPr lang="it-IT" b="1" dirty="0"/>
-              <a:t>Gestire una sua parte personale </a:t>
+              <a:t>Gestire una sua parte personale</a:t>
             </a:r>
             <a:r>
               <a:rPr lang="it-IT" dirty="0"/>
-              <a:t>(parte superiore del menù) in cui sarà in grado di vedere gli annunci che ha pubblicato, le sue impostazioni, messaggi ricevuti e oggetti/account preferiti </a:t>
+              <a:t>,</a:t>
+            </a:r>
+            <a:r>
+              <a:rPr lang="it-IT" b="1" dirty="0"/>
+              <a:t> </a:t>
+            </a:r>
+            <a:r>
+              <a:rPr lang="it-IT" dirty="0"/>
+              <a:t>in cui sarà in grado di: vedere gli annunci che ha pubblicato, le sue impostazioni, messaggi ricevuti e oggetti/account preferiti, …</a:t>
             </a:r>
           </a:p>
           <a:p>
             <a:pPr lvl="1"/>
             <a:r>
               <a:rPr lang="it-IT" b="1" dirty="0"/>
-              <a:t>Cercare annunci secondo più categorie </a:t>
+              <a:t>Cercare inserzioni secondo più categorie </a:t>
             </a:r>
             <a:r>
               <a:rPr lang="it-IT" dirty="0"/>
@@ -5939,6 +5948,84 @@
       </p:transition>
     </mc:Fallback>
   </mc:AlternateContent>
+</p:sld>
+</file>
+
+<file path=ppt/slides/slide6.xml><?xml version="1.0" encoding="utf-8"?>
+<p:sld xmlns:a="http://schemas.openxmlformats.org/drawingml/2006/main" xmlns:r="http://schemas.openxmlformats.org/officeDocument/2006/relationships" xmlns:p="http://schemas.openxmlformats.org/presentationml/2006/main">
+  <p:cSld>
+    <p:spTree>
+      <p:nvGrpSpPr>
+        <p:cNvPr id="1" name=""/>
+        <p:cNvGrpSpPr/>
+        <p:nvPr/>
+      </p:nvGrpSpPr>
+      <p:grpSpPr>
+        <a:xfrm>
+          <a:off x="0" y="0"/>
+          <a:ext cx="0" cy="0"/>
+          <a:chOff x="0" y="0"/>
+          <a:chExt cx="0" cy="0"/>
+        </a:xfrm>
+      </p:grpSpPr>
+      <p:sp>
+        <p:nvSpPr>
+          <p:cNvPr id="2" name="Title 1">
+            <a:extLst>
+              <a:ext uri="{FF2B5EF4-FFF2-40B4-BE49-F238E27FC236}">
+                <a16:creationId xmlns:a16="http://schemas.microsoft.com/office/drawing/2014/main" id="{F2099ADF-CDC0-45F7-BEBF-AAEE28499177}"/>
+              </a:ext>
+            </a:extLst>
+          </p:cNvPr>
+          <p:cNvSpPr>
+            <a:spLocks noGrp="1"/>
+          </p:cNvSpPr>
+          <p:nvPr>
+            <p:ph type="title"/>
+          </p:nvPr>
+        </p:nvSpPr>
+        <p:spPr>
+          <a:xfrm>
+            <a:off x="838200" y="2766218"/>
+            <a:ext cx="10515600" cy="1325563"/>
+          </a:xfrm>
+        </p:spPr>
+        <p:txBody>
+          <a:bodyPr>
+            <a:normAutofit/>
+          </a:bodyPr>
+          <a:lstStyle/>
+          <a:p>
+            <a:pPr algn="ctr"/>
+            <a:r>
+              <a:rPr lang="en-US" sz="6000" b="1" dirty="0" err="1"/>
+              <a:t>Grazie</a:t>
+            </a:r>
+            <a:r>
+              <a:rPr lang="en-US" sz="6000" b="1" dirty="0"/>
+              <a:t> per </a:t>
+            </a:r>
+            <a:r>
+              <a:rPr lang="en-US" sz="6000" b="1" dirty="0" err="1"/>
+              <a:t>l’attenzione</a:t>
+            </a:r>
+            <a:r>
+              <a:rPr lang="en-US" sz="6000" b="1" dirty="0"/>
+              <a:t>!</a:t>
+            </a:r>
+          </a:p>
+        </p:txBody>
+      </p:sp>
+    </p:spTree>
+    <p:extLst>
+      <p:ext uri="{BB962C8B-B14F-4D97-AF65-F5344CB8AC3E}">
+        <p14:creationId xmlns:p14="http://schemas.microsoft.com/office/powerpoint/2010/main" val="520242828"/>
+      </p:ext>
+    </p:extLst>
+  </p:cSld>
+  <p:clrMapOvr>
+    <a:masterClrMapping/>
+  </p:clrMapOvr>
 </p:sld>
 </file>
 

</xml_diff>